<commit_message>
corretto ancora. mannaggia libreoffice.
</commit_message>
<xml_diff>
--- a/tesina/Poster Eccellenza Fusco-Campello.pptx
+++ b/tesina/Poster Eccellenza Fusco-Campello.pptx
@@ -34,7 +34,7 @@
       </p:grpSpPr>
       <p:sp>
         <p:nvSpPr>
-          <p:cNvPr id="39" name="PlaceHolder 1"/>
+          <p:cNvPr id="36" name="PlaceHolder 1"/>
           <p:cNvSpPr>
             <a:spLocks noGrp="1"/>
           </p:cNvSpPr>
@@ -84,7 +84,7 @@
       </p:sp>
       <p:sp>
         <p:nvSpPr>
-          <p:cNvPr id="40" name="PlaceHolder 2"/>
+          <p:cNvPr id="37" name="PlaceHolder 2"/>
           <p:cNvSpPr>
             <a:spLocks noGrp="1"/>
           </p:cNvSpPr>
@@ -134,7 +134,7 @@
       </p:sp>
       <p:sp>
         <p:nvSpPr>
-          <p:cNvPr id="41" name="PlaceHolder 3"/>
+          <p:cNvPr id="38" name="PlaceHolder 3"/>
           <p:cNvSpPr>
             <a:spLocks noGrp="1"/>
           </p:cNvSpPr>
@@ -185,7 +185,7 @@
       </p:sp>
       <p:sp>
         <p:nvSpPr>
-          <p:cNvPr id="42" name="PlaceHolder 4"/>
+          <p:cNvPr id="39" name="PlaceHolder 4"/>
           <p:cNvSpPr>
             <a:spLocks noGrp="1"/>
           </p:cNvSpPr>
@@ -235,7 +235,7 @@
       </p:sp>
       <p:sp>
         <p:nvSpPr>
-          <p:cNvPr id="43" name="PlaceHolder 5"/>
+          <p:cNvPr id="40" name="PlaceHolder 5"/>
           <p:cNvSpPr>
             <a:spLocks noGrp="1"/>
           </p:cNvSpPr>
@@ -256,7 +256,7 @@
           <a:bodyPr lIns="0" rIns="0" tIns="0" bIns="0" anchor="b"/>
           <a:p>
             <a:pPr algn="r"/>
-            <a:fld id="{3C8908DC-1456-4DFD-B397-1B897B47D73A}" type="slidenum">
+            <a:fld id="{6136C874-5B15-466C-85A8-FAC9AFCCC67F}" type="slidenum">
               <a:rPr b="0" lang="it-IT" sz="1400" spc="-1" strike="noStrike">
                 <a:solidFill>
                   <a:srgbClr val="000000"/>
@@ -309,7 +309,7 @@
       </p:grpSpPr>
       <p:sp>
         <p:nvSpPr>
-          <p:cNvPr id="54" name="PlaceHolder 1"/>
+          <p:cNvPr id="51" name="PlaceHolder 1"/>
           <p:cNvSpPr>
             <a:spLocks noGrp="1"/>
           </p:cNvSpPr>
@@ -320,14 +320,14 @@
         <p:spPr>
           <a:xfrm>
             <a:off x="685800" y="4400640"/>
-            <a:ext cx="5486040" cy="3600000"/>
-          </a:xfrm>
-          <a:prstGeom prst="rect">
-            <a:avLst/>
-          </a:prstGeom>
-        </p:spPr>
-        <p:txBody>
-          <a:bodyPr/>
+            <a:ext cx="5485320" cy="3599280"/>
+          </a:xfrm>
+          <a:prstGeom prst="rect">
+            <a:avLst/>
+          </a:prstGeom>
+        </p:spPr>
+        <p:txBody>
+          <a:bodyPr lIns="0" rIns="0" tIns="0" bIns="0"/>
           <a:p>
             <a:endParaRPr b="0" lang="it-IT" sz="2000" spc="-1" strike="noStrike">
               <a:solidFill>
@@ -345,14 +345,14 @@
       </p:sp>
       <p:sp>
         <p:nvSpPr>
-          <p:cNvPr id="55" name="TextShape 2"/>
-          <p:cNvSpPr txBox="1"/>
+          <p:cNvPr id="52" name="CustomShape 2"/>
+          <p:cNvSpPr/>
           <p:nvPr/>
         </p:nvSpPr>
         <p:spPr>
           <a:xfrm>
             <a:off x="3884760" y="8685360"/>
-            <a:ext cx="2971440" cy="458280"/>
+            <a:ext cx="2970720" cy="457560"/>
           </a:xfrm>
           <a:prstGeom prst="rect">
             <a:avLst/>
@@ -362,15 +362,21 @@
             <a:noFill/>
           </a:ln>
         </p:spPr>
-        <p:txBody>
-          <a:bodyPr anchor="b"/>
+        <p:style>
+          <a:lnRef idx="0"/>
+          <a:fillRef idx="0"/>
+          <a:effectRef idx="0"/>
+          <a:fontRef idx="minor"/>
+        </p:style>
+        <p:txBody>
+          <a:bodyPr lIns="90000" rIns="90000" tIns="45000" bIns="45000" anchor="b"/>
           <a:p>
             <a:pPr algn="r">
               <a:lnSpc>
                 <a:spcPct val="100000"/>
               </a:lnSpc>
             </a:pPr>
-            <a:fld id="{A021A3E1-8E46-4AEA-913E-9EBD1AD9896E}" type="slidenum">
+            <a:fld id="{1646CB93-D47E-47C2-B182-AC887C021F54}" type="slidenum">
               <a:rPr b="0" lang="it-IT" sz="1200" spc="-1" strike="noStrike">
                 <a:solidFill>
                   <a:srgbClr val="000000"/>
@@ -385,16 +391,16 @@
               </a:rPr>
               <a:t>&lt;number&gt;</a:t>
             </a:fld>
-            <a:endParaRPr b="0" lang="it-IT" sz="1400" spc="-1" strike="noStrike">
-              <a:solidFill>
-                <a:srgbClr val="000000"/>
-              </a:solidFill>
-              <a:uFill>
-                <a:solidFill>
-                  <a:srgbClr val="ffffff"/>
-                </a:solidFill>
-              </a:uFill>
-              <a:latin typeface="Times New Roman"/>
+            <a:endParaRPr b="0" lang="it-IT" sz="1800" spc="-1" strike="noStrike">
+              <a:solidFill>
+                <a:srgbClr val="000000"/>
+              </a:solidFill>
+              <a:uFill>
+                <a:solidFill>
+                  <a:srgbClr val="ffffff"/>
+                </a:solidFill>
+              </a:uFill>
+              <a:latin typeface="Arial"/>
             </a:endParaRPr>
           </a:p>
         </p:txBody>
@@ -445,7 +451,7 @@
       </p:grpSpPr>
       <p:sp>
         <p:nvSpPr>
-          <p:cNvPr id="26" name="PlaceHolder 1"/>
+          <p:cNvPr id="23" name="PlaceHolder 1"/>
           <p:cNvSpPr>
             <a:spLocks noGrp="1"/>
           </p:cNvSpPr>
@@ -456,7 +462,7 @@
         <p:spPr>
           <a:xfrm>
             <a:off x="567000" y="1749960"/>
-            <a:ext cx="6425280" cy="3722040"/>
+            <a:ext cx="6424560" cy="3721320"/>
           </a:xfrm>
           <a:prstGeom prst="rect">
             <a:avLst/>
@@ -465,23 +471,24 @@
         <p:txBody>
           <a:bodyPr lIns="0" rIns="0" tIns="0" bIns="0" anchor="ctr"/>
           <a:p>
-            <a:endParaRPr b="0" lang="it-IT" sz="1160" spc="-1" strike="noStrike">
-              <a:solidFill>
-                <a:srgbClr val="000000"/>
-              </a:solidFill>
-              <a:uFill>
-                <a:solidFill>
-                  <a:srgbClr val="ffffff"/>
-                </a:solidFill>
-              </a:uFill>
-              <a:latin typeface="Calibri"/>
-            </a:endParaRPr>
-          </a:p>
-        </p:txBody>
-      </p:sp>
-      <p:sp>
-        <p:nvSpPr>
-          <p:cNvPr id="27" name="PlaceHolder 2"/>
+            <a:pPr algn="ctr"/>
+            <a:endParaRPr b="0" lang="it-IT" sz="4400" spc="-1" strike="noStrike">
+              <a:solidFill>
+                <a:srgbClr val="000000"/>
+              </a:solidFill>
+              <a:uFill>
+                <a:solidFill>
+                  <a:srgbClr val="ffffff"/>
+                </a:solidFill>
+              </a:uFill>
+              <a:latin typeface="Arial"/>
+            </a:endParaRPr>
+          </a:p>
+        </p:txBody>
+      </p:sp>
+      <p:sp>
+        <p:nvSpPr>
+          <p:cNvPr id="24" name="PlaceHolder 2"/>
           <p:cNvSpPr>
             <a:spLocks noGrp="1"/>
           </p:cNvSpPr>
@@ -492,7 +499,7 @@
         <p:spPr>
           <a:xfrm>
             <a:off x="377640" y="2501640"/>
-            <a:ext cx="6803280" cy="2957400"/>
+            <a:ext cx="6802920" cy="2957400"/>
           </a:xfrm>
           <a:prstGeom prst="rect">
             <a:avLst/>
@@ -501,23 +508,23 @@
         <p:txBody>
           <a:bodyPr lIns="0" rIns="0" tIns="0" bIns="0"/>
           <a:p>
-            <a:endParaRPr b="0" lang="it-IT" sz="2320" spc="-1" strike="noStrike">
-              <a:solidFill>
-                <a:srgbClr val="000000"/>
-              </a:solidFill>
-              <a:uFill>
-                <a:solidFill>
-                  <a:srgbClr val="ffffff"/>
-                </a:solidFill>
-              </a:uFill>
-              <a:latin typeface="Calibri"/>
-            </a:endParaRPr>
-          </a:p>
-        </p:txBody>
-      </p:sp>
-      <p:sp>
-        <p:nvSpPr>
-          <p:cNvPr id="28" name="PlaceHolder 3"/>
+            <a:endParaRPr b="0" lang="it-IT" sz="3200" spc="-1" strike="noStrike">
+              <a:solidFill>
+                <a:srgbClr val="000000"/>
+              </a:solidFill>
+              <a:uFill>
+                <a:solidFill>
+                  <a:srgbClr val="ffffff"/>
+                </a:solidFill>
+              </a:uFill>
+              <a:latin typeface="Arial"/>
+            </a:endParaRPr>
+          </a:p>
+        </p:txBody>
+      </p:sp>
+      <p:sp>
+        <p:nvSpPr>
+          <p:cNvPr id="25" name="PlaceHolder 3"/>
           <p:cNvSpPr>
             <a:spLocks noGrp="1"/>
           </p:cNvSpPr>
@@ -528,7 +535,7 @@
         <p:spPr>
           <a:xfrm>
             <a:off x="377640" y="5740560"/>
-            <a:ext cx="6803280" cy="2957400"/>
+            <a:ext cx="6802920" cy="2957400"/>
           </a:xfrm>
           <a:prstGeom prst="rect">
             <a:avLst/>
@@ -537,16 +544,16 @@
         <p:txBody>
           <a:bodyPr lIns="0" rIns="0" tIns="0" bIns="0"/>
           <a:p>
-            <a:endParaRPr b="0" lang="it-IT" sz="2320" spc="-1" strike="noStrike">
-              <a:solidFill>
-                <a:srgbClr val="000000"/>
-              </a:solidFill>
-              <a:uFill>
-                <a:solidFill>
-                  <a:srgbClr val="ffffff"/>
-                </a:solidFill>
-              </a:uFill>
-              <a:latin typeface="Calibri"/>
+            <a:endParaRPr b="0" lang="it-IT" sz="3200" spc="-1" strike="noStrike">
+              <a:solidFill>
+                <a:srgbClr val="000000"/>
+              </a:solidFill>
+              <a:uFill>
+                <a:solidFill>
+                  <a:srgbClr val="ffffff"/>
+                </a:solidFill>
+              </a:uFill>
+              <a:latin typeface="Arial"/>
             </a:endParaRPr>
           </a:p>
         </p:txBody>
@@ -575,7 +582,7 @@
       </p:grpSpPr>
       <p:sp>
         <p:nvSpPr>
-          <p:cNvPr id="29" name="PlaceHolder 1"/>
+          <p:cNvPr id="26" name="PlaceHolder 1"/>
           <p:cNvSpPr>
             <a:spLocks noGrp="1"/>
           </p:cNvSpPr>
@@ -586,7 +593,7 @@
         <p:spPr>
           <a:xfrm>
             <a:off x="567000" y="1749960"/>
-            <a:ext cx="6425280" cy="3722040"/>
+            <a:ext cx="6424560" cy="3721320"/>
           </a:xfrm>
           <a:prstGeom prst="rect">
             <a:avLst/>
@@ -595,23 +602,24 @@
         <p:txBody>
           <a:bodyPr lIns="0" rIns="0" tIns="0" bIns="0" anchor="ctr"/>
           <a:p>
-            <a:endParaRPr b="0" lang="it-IT" sz="1160" spc="-1" strike="noStrike">
-              <a:solidFill>
-                <a:srgbClr val="000000"/>
-              </a:solidFill>
-              <a:uFill>
-                <a:solidFill>
-                  <a:srgbClr val="ffffff"/>
-                </a:solidFill>
-              </a:uFill>
-              <a:latin typeface="Calibri"/>
-            </a:endParaRPr>
-          </a:p>
-        </p:txBody>
-      </p:sp>
-      <p:sp>
-        <p:nvSpPr>
-          <p:cNvPr id="30" name="PlaceHolder 2"/>
+            <a:pPr algn="ctr"/>
+            <a:endParaRPr b="0" lang="it-IT" sz="4400" spc="-1" strike="noStrike">
+              <a:solidFill>
+                <a:srgbClr val="000000"/>
+              </a:solidFill>
+              <a:uFill>
+                <a:solidFill>
+                  <a:srgbClr val="ffffff"/>
+                </a:solidFill>
+              </a:uFill>
+              <a:latin typeface="Arial"/>
+            </a:endParaRPr>
+          </a:p>
+        </p:txBody>
+      </p:sp>
+      <p:sp>
+        <p:nvSpPr>
+          <p:cNvPr id="27" name="PlaceHolder 2"/>
           <p:cNvSpPr>
             <a:spLocks noGrp="1"/>
           </p:cNvSpPr>
@@ -622,7 +630,7 @@
         <p:spPr>
           <a:xfrm>
             <a:off x="377640" y="2501640"/>
-            <a:ext cx="3319920" cy="2957400"/>
+            <a:ext cx="3319560" cy="2957400"/>
           </a:xfrm>
           <a:prstGeom prst="rect">
             <a:avLst/>
@@ -631,23 +639,23 @@
         <p:txBody>
           <a:bodyPr lIns="0" rIns="0" tIns="0" bIns="0"/>
           <a:p>
-            <a:endParaRPr b="0" lang="it-IT" sz="2320" spc="-1" strike="noStrike">
-              <a:solidFill>
-                <a:srgbClr val="000000"/>
-              </a:solidFill>
-              <a:uFill>
-                <a:solidFill>
-                  <a:srgbClr val="ffffff"/>
-                </a:solidFill>
-              </a:uFill>
-              <a:latin typeface="Calibri"/>
-            </a:endParaRPr>
-          </a:p>
-        </p:txBody>
-      </p:sp>
-      <p:sp>
-        <p:nvSpPr>
-          <p:cNvPr id="31" name="PlaceHolder 3"/>
+            <a:endParaRPr b="0" lang="it-IT" sz="3200" spc="-1" strike="noStrike">
+              <a:solidFill>
+                <a:srgbClr val="000000"/>
+              </a:solidFill>
+              <a:uFill>
+                <a:solidFill>
+                  <a:srgbClr val="ffffff"/>
+                </a:solidFill>
+              </a:uFill>
+              <a:latin typeface="Arial"/>
+            </a:endParaRPr>
+          </a:p>
+        </p:txBody>
+      </p:sp>
+      <p:sp>
+        <p:nvSpPr>
+          <p:cNvPr id="28" name="PlaceHolder 3"/>
           <p:cNvSpPr>
             <a:spLocks noGrp="1"/>
           </p:cNvSpPr>
@@ -657,8 +665,8 @@
         </p:nvSpPr>
         <p:spPr>
           <a:xfrm>
-            <a:off x="3863880" y="2501640"/>
-            <a:ext cx="3319920" cy="2957400"/>
+            <a:off x="3863520" y="2501640"/>
+            <a:ext cx="3319560" cy="2957400"/>
           </a:xfrm>
           <a:prstGeom prst="rect">
             <a:avLst/>
@@ -667,23 +675,23 @@
         <p:txBody>
           <a:bodyPr lIns="0" rIns="0" tIns="0" bIns="0"/>
           <a:p>
-            <a:endParaRPr b="0" lang="it-IT" sz="2320" spc="-1" strike="noStrike">
-              <a:solidFill>
-                <a:srgbClr val="000000"/>
-              </a:solidFill>
-              <a:uFill>
-                <a:solidFill>
-                  <a:srgbClr val="ffffff"/>
-                </a:solidFill>
-              </a:uFill>
-              <a:latin typeface="Calibri"/>
-            </a:endParaRPr>
-          </a:p>
-        </p:txBody>
-      </p:sp>
-      <p:sp>
-        <p:nvSpPr>
-          <p:cNvPr id="32" name="PlaceHolder 4"/>
+            <a:endParaRPr b="0" lang="it-IT" sz="3200" spc="-1" strike="noStrike">
+              <a:solidFill>
+                <a:srgbClr val="000000"/>
+              </a:solidFill>
+              <a:uFill>
+                <a:solidFill>
+                  <a:srgbClr val="ffffff"/>
+                </a:solidFill>
+              </a:uFill>
+              <a:latin typeface="Arial"/>
+            </a:endParaRPr>
+          </a:p>
+        </p:txBody>
+      </p:sp>
+      <p:sp>
+        <p:nvSpPr>
+          <p:cNvPr id="29" name="PlaceHolder 4"/>
           <p:cNvSpPr>
             <a:spLocks noGrp="1"/>
           </p:cNvSpPr>
@@ -693,8 +701,8 @@
         </p:nvSpPr>
         <p:spPr>
           <a:xfrm>
-            <a:off x="3863880" y="5740560"/>
-            <a:ext cx="3319920" cy="2957400"/>
+            <a:off x="3863520" y="5740560"/>
+            <a:ext cx="3319560" cy="2957400"/>
           </a:xfrm>
           <a:prstGeom prst="rect">
             <a:avLst/>
@@ -703,23 +711,23 @@
         <p:txBody>
           <a:bodyPr lIns="0" rIns="0" tIns="0" bIns="0"/>
           <a:p>
-            <a:endParaRPr b="0" lang="it-IT" sz="2320" spc="-1" strike="noStrike">
-              <a:solidFill>
-                <a:srgbClr val="000000"/>
-              </a:solidFill>
-              <a:uFill>
-                <a:solidFill>
-                  <a:srgbClr val="ffffff"/>
-                </a:solidFill>
-              </a:uFill>
-              <a:latin typeface="Calibri"/>
-            </a:endParaRPr>
-          </a:p>
-        </p:txBody>
-      </p:sp>
-      <p:sp>
-        <p:nvSpPr>
-          <p:cNvPr id="33" name="PlaceHolder 5"/>
+            <a:endParaRPr b="0" lang="it-IT" sz="3200" spc="-1" strike="noStrike">
+              <a:solidFill>
+                <a:srgbClr val="000000"/>
+              </a:solidFill>
+              <a:uFill>
+                <a:solidFill>
+                  <a:srgbClr val="ffffff"/>
+                </a:solidFill>
+              </a:uFill>
+              <a:latin typeface="Arial"/>
+            </a:endParaRPr>
+          </a:p>
+        </p:txBody>
+      </p:sp>
+      <p:sp>
+        <p:nvSpPr>
+          <p:cNvPr id="30" name="PlaceHolder 5"/>
           <p:cNvSpPr>
             <a:spLocks noGrp="1"/>
           </p:cNvSpPr>
@@ -730,7 +738,7 @@
         <p:spPr>
           <a:xfrm>
             <a:off x="377640" y="5740560"/>
-            <a:ext cx="3319920" cy="2957400"/>
+            <a:ext cx="3319560" cy="2957400"/>
           </a:xfrm>
           <a:prstGeom prst="rect">
             <a:avLst/>
@@ -739,16 +747,16 @@
         <p:txBody>
           <a:bodyPr lIns="0" rIns="0" tIns="0" bIns="0"/>
           <a:p>
-            <a:endParaRPr b="0" lang="it-IT" sz="2320" spc="-1" strike="noStrike">
-              <a:solidFill>
-                <a:srgbClr val="000000"/>
-              </a:solidFill>
-              <a:uFill>
-                <a:solidFill>
-                  <a:srgbClr val="ffffff"/>
-                </a:solidFill>
-              </a:uFill>
-              <a:latin typeface="Calibri"/>
+            <a:endParaRPr b="0" lang="it-IT" sz="3200" spc="-1" strike="noStrike">
+              <a:solidFill>
+                <a:srgbClr val="000000"/>
+              </a:solidFill>
+              <a:uFill>
+                <a:solidFill>
+                  <a:srgbClr val="ffffff"/>
+                </a:solidFill>
+              </a:uFill>
+              <a:latin typeface="Arial"/>
             </a:endParaRPr>
           </a:p>
         </p:txBody>
@@ -777,7 +785,7 @@
       </p:grpSpPr>
       <p:sp>
         <p:nvSpPr>
-          <p:cNvPr id="34" name="PlaceHolder 1"/>
+          <p:cNvPr id="31" name="PlaceHolder 1"/>
           <p:cNvSpPr>
             <a:spLocks noGrp="1"/>
           </p:cNvSpPr>
@@ -788,7 +796,7 @@
         <p:spPr>
           <a:xfrm>
             <a:off x="567000" y="1749960"/>
-            <a:ext cx="6425280" cy="3722040"/>
+            <a:ext cx="6424560" cy="3721320"/>
           </a:xfrm>
           <a:prstGeom prst="rect">
             <a:avLst/>
@@ -797,23 +805,24 @@
         <p:txBody>
           <a:bodyPr lIns="0" rIns="0" tIns="0" bIns="0" anchor="ctr"/>
           <a:p>
-            <a:endParaRPr b="0" lang="it-IT" sz="1160" spc="-1" strike="noStrike">
-              <a:solidFill>
-                <a:srgbClr val="000000"/>
-              </a:solidFill>
-              <a:uFill>
-                <a:solidFill>
-                  <a:srgbClr val="ffffff"/>
-                </a:solidFill>
-              </a:uFill>
-              <a:latin typeface="Calibri"/>
-            </a:endParaRPr>
-          </a:p>
-        </p:txBody>
-      </p:sp>
-      <p:sp>
-        <p:nvSpPr>
-          <p:cNvPr id="35" name="PlaceHolder 2"/>
+            <a:pPr algn="ctr"/>
+            <a:endParaRPr b="0" lang="it-IT" sz="4400" spc="-1" strike="noStrike">
+              <a:solidFill>
+                <a:srgbClr val="000000"/>
+              </a:solidFill>
+              <a:uFill>
+                <a:solidFill>
+                  <a:srgbClr val="ffffff"/>
+                </a:solidFill>
+              </a:uFill>
+              <a:latin typeface="Arial"/>
+            </a:endParaRPr>
+          </a:p>
+        </p:txBody>
+      </p:sp>
+      <p:sp>
+        <p:nvSpPr>
+          <p:cNvPr id="32" name="PlaceHolder 2"/>
           <p:cNvSpPr>
             <a:spLocks noGrp="1"/>
           </p:cNvSpPr>
@@ -824,7 +833,7 @@
         <p:spPr>
           <a:xfrm>
             <a:off x="377640" y="2501640"/>
-            <a:ext cx="6803280" cy="6200640"/>
+            <a:ext cx="6802920" cy="6200280"/>
           </a:xfrm>
           <a:prstGeom prst="rect">
             <a:avLst/>
@@ -833,23 +842,23 @@
         <p:txBody>
           <a:bodyPr lIns="0" rIns="0" tIns="0" bIns="0"/>
           <a:p>
-            <a:endParaRPr b="0" lang="it-IT" sz="2320" spc="-1" strike="noStrike">
-              <a:solidFill>
-                <a:srgbClr val="000000"/>
-              </a:solidFill>
-              <a:uFill>
-                <a:solidFill>
-                  <a:srgbClr val="ffffff"/>
-                </a:solidFill>
-              </a:uFill>
-              <a:latin typeface="Calibri"/>
-            </a:endParaRPr>
-          </a:p>
-        </p:txBody>
-      </p:sp>
-      <p:sp>
-        <p:nvSpPr>
-          <p:cNvPr id="36" name="PlaceHolder 3"/>
+            <a:endParaRPr b="0" lang="it-IT" sz="3200" spc="-1" strike="noStrike">
+              <a:solidFill>
+                <a:srgbClr val="000000"/>
+              </a:solidFill>
+              <a:uFill>
+                <a:solidFill>
+                  <a:srgbClr val="ffffff"/>
+                </a:solidFill>
+              </a:uFill>
+              <a:latin typeface="Arial"/>
+            </a:endParaRPr>
+          </a:p>
+        </p:txBody>
+      </p:sp>
+      <p:sp>
+        <p:nvSpPr>
+          <p:cNvPr id="33" name="PlaceHolder 3"/>
           <p:cNvSpPr>
             <a:spLocks noGrp="1"/>
           </p:cNvSpPr>
@@ -860,7 +869,7 @@
         <p:spPr>
           <a:xfrm>
             <a:off x="377640" y="2501640"/>
-            <a:ext cx="6803280" cy="6200640"/>
+            <a:ext cx="6802920" cy="6200280"/>
           </a:xfrm>
           <a:prstGeom prst="rect">
             <a:avLst/>
@@ -869,23 +878,23 @@
         <p:txBody>
           <a:bodyPr lIns="0" rIns="0" tIns="0" bIns="0"/>
           <a:p>
-            <a:endParaRPr b="0" lang="it-IT" sz="2320" spc="-1" strike="noStrike">
-              <a:solidFill>
-                <a:srgbClr val="000000"/>
-              </a:solidFill>
-              <a:uFill>
-                <a:solidFill>
-                  <a:srgbClr val="ffffff"/>
-                </a:solidFill>
-              </a:uFill>
-              <a:latin typeface="Calibri"/>
+            <a:endParaRPr b="0" lang="it-IT" sz="3200" spc="-1" strike="noStrike">
+              <a:solidFill>
+                <a:srgbClr val="000000"/>
+              </a:solidFill>
+              <a:uFill>
+                <a:solidFill>
+                  <a:srgbClr val="ffffff"/>
+                </a:solidFill>
+              </a:uFill>
+              <a:latin typeface="Arial"/>
             </a:endParaRPr>
           </a:p>
         </p:txBody>
       </p:sp>
       <p:pic>
         <p:nvPicPr>
-          <p:cNvPr id="37" name="" descr=""/>
+          <p:cNvPr id="34" name="" descr=""/>
           <p:cNvPicPr/>
           <p:nvPr/>
         </p:nvPicPr>
@@ -895,8 +904,8 @@
         </p:blipFill>
         <p:spPr>
           <a:xfrm>
-            <a:off x="377640" y="2887920"/>
-            <a:ext cx="6803280" cy="5428080"/>
+            <a:off x="377280" y="2887560"/>
+            <a:ext cx="6802920" cy="5427720"/>
           </a:xfrm>
           <a:prstGeom prst="rect">
             <a:avLst/>
@@ -908,7 +917,7 @@
       </p:pic>
       <p:pic>
         <p:nvPicPr>
-          <p:cNvPr id="38" name="" descr=""/>
+          <p:cNvPr id="35" name="" descr=""/>
           <p:cNvPicPr/>
           <p:nvPr/>
         </p:nvPicPr>
@@ -918,8 +927,8 @@
         </p:blipFill>
         <p:spPr>
           <a:xfrm>
-            <a:off x="377640" y="2887920"/>
-            <a:ext cx="6803280" cy="5428080"/>
+            <a:off x="377280" y="2887560"/>
+            <a:ext cx="6802920" cy="5427720"/>
           </a:xfrm>
           <a:prstGeom prst="rect">
             <a:avLst/>
@@ -953,7 +962,7 @@
       </p:grpSpPr>
       <p:sp>
         <p:nvSpPr>
-          <p:cNvPr id="5" name="PlaceHolder 1"/>
+          <p:cNvPr id="2" name="PlaceHolder 1"/>
           <p:cNvSpPr>
             <a:spLocks noGrp="1"/>
           </p:cNvSpPr>
@@ -964,7 +973,7 @@
         <p:spPr>
           <a:xfrm>
             <a:off x="567000" y="1749960"/>
-            <a:ext cx="6425280" cy="3722040"/>
+            <a:ext cx="6424560" cy="3721320"/>
           </a:xfrm>
           <a:prstGeom prst="rect">
             <a:avLst/>
@@ -973,23 +982,24 @@
         <p:txBody>
           <a:bodyPr lIns="0" rIns="0" tIns="0" bIns="0" anchor="ctr"/>
           <a:p>
-            <a:endParaRPr b="0" lang="it-IT" sz="1160" spc="-1" strike="noStrike">
-              <a:solidFill>
-                <a:srgbClr val="000000"/>
-              </a:solidFill>
-              <a:uFill>
-                <a:solidFill>
-                  <a:srgbClr val="ffffff"/>
-                </a:solidFill>
-              </a:uFill>
-              <a:latin typeface="Calibri"/>
-            </a:endParaRPr>
-          </a:p>
-        </p:txBody>
-      </p:sp>
-      <p:sp>
-        <p:nvSpPr>
-          <p:cNvPr id="6" name="PlaceHolder 2"/>
+            <a:pPr algn="ctr"/>
+            <a:endParaRPr b="0" lang="it-IT" sz="4400" spc="-1" strike="noStrike">
+              <a:solidFill>
+                <a:srgbClr val="000000"/>
+              </a:solidFill>
+              <a:uFill>
+                <a:solidFill>
+                  <a:srgbClr val="ffffff"/>
+                </a:solidFill>
+              </a:uFill>
+              <a:latin typeface="Arial"/>
+            </a:endParaRPr>
+          </a:p>
+        </p:txBody>
+      </p:sp>
+      <p:sp>
+        <p:nvSpPr>
+          <p:cNvPr id="3" name="PlaceHolder 2"/>
           <p:cNvSpPr>
             <a:spLocks noGrp="1"/>
           </p:cNvSpPr>
@@ -1000,7 +1010,7 @@
         <p:spPr>
           <a:xfrm>
             <a:off x="377640" y="2501640"/>
-            <a:ext cx="6803280" cy="6200640"/>
+            <a:ext cx="6802920" cy="6200280"/>
           </a:xfrm>
           <a:prstGeom prst="rect">
             <a:avLst/>
@@ -1048,7 +1058,7 @@
       </p:grpSpPr>
       <p:sp>
         <p:nvSpPr>
-          <p:cNvPr id="7" name="PlaceHolder 1"/>
+          <p:cNvPr id="4" name="PlaceHolder 1"/>
           <p:cNvSpPr>
             <a:spLocks noGrp="1"/>
           </p:cNvSpPr>
@@ -1059,7 +1069,7 @@
         <p:spPr>
           <a:xfrm>
             <a:off x="567000" y="1749960"/>
-            <a:ext cx="6425280" cy="3722040"/>
+            <a:ext cx="6424560" cy="3721320"/>
           </a:xfrm>
           <a:prstGeom prst="rect">
             <a:avLst/>
@@ -1068,23 +1078,24 @@
         <p:txBody>
           <a:bodyPr lIns="0" rIns="0" tIns="0" bIns="0" anchor="ctr"/>
           <a:p>
-            <a:endParaRPr b="0" lang="it-IT" sz="1160" spc="-1" strike="noStrike">
-              <a:solidFill>
-                <a:srgbClr val="000000"/>
-              </a:solidFill>
-              <a:uFill>
-                <a:solidFill>
-                  <a:srgbClr val="ffffff"/>
-                </a:solidFill>
-              </a:uFill>
-              <a:latin typeface="Calibri"/>
-            </a:endParaRPr>
-          </a:p>
-        </p:txBody>
-      </p:sp>
-      <p:sp>
-        <p:nvSpPr>
-          <p:cNvPr id="8" name="PlaceHolder 2"/>
+            <a:pPr algn="ctr"/>
+            <a:endParaRPr b="0" lang="it-IT" sz="4400" spc="-1" strike="noStrike">
+              <a:solidFill>
+                <a:srgbClr val="000000"/>
+              </a:solidFill>
+              <a:uFill>
+                <a:solidFill>
+                  <a:srgbClr val="ffffff"/>
+                </a:solidFill>
+              </a:uFill>
+              <a:latin typeface="Arial"/>
+            </a:endParaRPr>
+          </a:p>
+        </p:txBody>
+      </p:sp>
+      <p:sp>
+        <p:nvSpPr>
+          <p:cNvPr id="5" name="PlaceHolder 2"/>
           <p:cNvSpPr>
             <a:spLocks noGrp="1"/>
           </p:cNvSpPr>
@@ -1095,7 +1106,7 @@
         <p:spPr>
           <a:xfrm>
             <a:off x="377640" y="2501640"/>
-            <a:ext cx="6803280" cy="6200640"/>
+            <a:ext cx="6802920" cy="6200280"/>
           </a:xfrm>
           <a:prstGeom prst="rect">
             <a:avLst/>
@@ -1104,16 +1115,16 @@
         <p:txBody>
           <a:bodyPr lIns="0" rIns="0" tIns="0" bIns="0"/>
           <a:p>
-            <a:endParaRPr b="0" lang="it-IT" sz="2320" spc="-1" strike="noStrike">
-              <a:solidFill>
-                <a:srgbClr val="000000"/>
-              </a:solidFill>
-              <a:uFill>
-                <a:solidFill>
-                  <a:srgbClr val="ffffff"/>
-                </a:solidFill>
-              </a:uFill>
-              <a:latin typeface="Calibri"/>
+            <a:endParaRPr b="0" lang="it-IT" sz="3200" spc="-1" strike="noStrike">
+              <a:solidFill>
+                <a:srgbClr val="000000"/>
+              </a:solidFill>
+              <a:uFill>
+                <a:solidFill>
+                  <a:srgbClr val="ffffff"/>
+                </a:solidFill>
+              </a:uFill>
+              <a:latin typeface="Arial"/>
             </a:endParaRPr>
           </a:p>
         </p:txBody>
@@ -1142,7 +1153,7 @@
       </p:grpSpPr>
       <p:sp>
         <p:nvSpPr>
-          <p:cNvPr id="9" name="PlaceHolder 1"/>
+          <p:cNvPr id="6" name="PlaceHolder 1"/>
           <p:cNvSpPr>
             <a:spLocks noGrp="1"/>
           </p:cNvSpPr>
@@ -1153,7 +1164,7 @@
         <p:spPr>
           <a:xfrm>
             <a:off x="567000" y="1749960"/>
-            <a:ext cx="6425280" cy="3722040"/>
+            <a:ext cx="6424560" cy="3721320"/>
           </a:xfrm>
           <a:prstGeom prst="rect">
             <a:avLst/>
@@ -1162,23 +1173,24 @@
         <p:txBody>
           <a:bodyPr lIns="0" rIns="0" tIns="0" bIns="0" anchor="ctr"/>
           <a:p>
-            <a:endParaRPr b="0" lang="it-IT" sz="1160" spc="-1" strike="noStrike">
-              <a:solidFill>
-                <a:srgbClr val="000000"/>
-              </a:solidFill>
-              <a:uFill>
-                <a:solidFill>
-                  <a:srgbClr val="ffffff"/>
-                </a:solidFill>
-              </a:uFill>
-              <a:latin typeface="Calibri"/>
-            </a:endParaRPr>
-          </a:p>
-        </p:txBody>
-      </p:sp>
-      <p:sp>
-        <p:nvSpPr>
-          <p:cNvPr id="10" name="PlaceHolder 2"/>
+            <a:pPr algn="ctr"/>
+            <a:endParaRPr b="0" lang="it-IT" sz="4400" spc="-1" strike="noStrike">
+              <a:solidFill>
+                <a:srgbClr val="000000"/>
+              </a:solidFill>
+              <a:uFill>
+                <a:solidFill>
+                  <a:srgbClr val="ffffff"/>
+                </a:solidFill>
+              </a:uFill>
+              <a:latin typeface="Arial"/>
+            </a:endParaRPr>
+          </a:p>
+        </p:txBody>
+      </p:sp>
+      <p:sp>
+        <p:nvSpPr>
+          <p:cNvPr id="7" name="PlaceHolder 2"/>
           <p:cNvSpPr>
             <a:spLocks noGrp="1"/>
           </p:cNvSpPr>
@@ -1189,7 +1201,7 @@
         <p:spPr>
           <a:xfrm>
             <a:off x="377640" y="2501640"/>
-            <a:ext cx="3319920" cy="6200640"/>
+            <a:ext cx="3319560" cy="6200280"/>
           </a:xfrm>
           <a:prstGeom prst="rect">
             <a:avLst/>
@@ -1198,23 +1210,23 @@
         <p:txBody>
           <a:bodyPr lIns="0" rIns="0" tIns="0" bIns="0"/>
           <a:p>
-            <a:endParaRPr b="0" lang="it-IT" sz="2320" spc="-1" strike="noStrike">
-              <a:solidFill>
-                <a:srgbClr val="000000"/>
-              </a:solidFill>
-              <a:uFill>
-                <a:solidFill>
-                  <a:srgbClr val="ffffff"/>
-                </a:solidFill>
-              </a:uFill>
-              <a:latin typeface="Calibri"/>
-            </a:endParaRPr>
-          </a:p>
-        </p:txBody>
-      </p:sp>
-      <p:sp>
-        <p:nvSpPr>
-          <p:cNvPr id="11" name="PlaceHolder 3"/>
+            <a:endParaRPr b="0" lang="it-IT" sz="3200" spc="-1" strike="noStrike">
+              <a:solidFill>
+                <a:srgbClr val="000000"/>
+              </a:solidFill>
+              <a:uFill>
+                <a:solidFill>
+                  <a:srgbClr val="ffffff"/>
+                </a:solidFill>
+              </a:uFill>
+              <a:latin typeface="Arial"/>
+            </a:endParaRPr>
+          </a:p>
+        </p:txBody>
+      </p:sp>
+      <p:sp>
+        <p:nvSpPr>
+          <p:cNvPr id="8" name="PlaceHolder 3"/>
           <p:cNvSpPr>
             <a:spLocks noGrp="1"/>
           </p:cNvSpPr>
@@ -1224,8 +1236,8 @@
         </p:nvSpPr>
         <p:spPr>
           <a:xfrm>
-            <a:off x="3863880" y="2501640"/>
-            <a:ext cx="3319920" cy="6200640"/>
+            <a:off x="3863520" y="2501640"/>
+            <a:ext cx="3319560" cy="6200280"/>
           </a:xfrm>
           <a:prstGeom prst="rect">
             <a:avLst/>
@@ -1234,16 +1246,16 @@
         <p:txBody>
           <a:bodyPr lIns="0" rIns="0" tIns="0" bIns="0"/>
           <a:p>
-            <a:endParaRPr b="0" lang="it-IT" sz="2320" spc="-1" strike="noStrike">
-              <a:solidFill>
-                <a:srgbClr val="000000"/>
-              </a:solidFill>
-              <a:uFill>
-                <a:solidFill>
-                  <a:srgbClr val="ffffff"/>
-                </a:solidFill>
-              </a:uFill>
-              <a:latin typeface="Calibri"/>
+            <a:endParaRPr b="0" lang="it-IT" sz="3200" spc="-1" strike="noStrike">
+              <a:solidFill>
+                <a:srgbClr val="000000"/>
+              </a:solidFill>
+              <a:uFill>
+                <a:solidFill>
+                  <a:srgbClr val="ffffff"/>
+                </a:solidFill>
+              </a:uFill>
+              <a:latin typeface="Arial"/>
             </a:endParaRPr>
           </a:p>
         </p:txBody>
@@ -1272,7 +1284,7 @@
       </p:grpSpPr>
       <p:sp>
         <p:nvSpPr>
-          <p:cNvPr id="12" name="PlaceHolder 1"/>
+          <p:cNvPr id="9" name="PlaceHolder 1"/>
           <p:cNvSpPr>
             <a:spLocks noGrp="1"/>
           </p:cNvSpPr>
@@ -1283,7 +1295,7 @@
         <p:spPr>
           <a:xfrm>
             <a:off x="567000" y="1749960"/>
-            <a:ext cx="6425280" cy="3722040"/>
+            <a:ext cx="6424560" cy="3721320"/>
           </a:xfrm>
           <a:prstGeom prst="rect">
             <a:avLst/>
@@ -1292,16 +1304,17 @@
         <p:txBody>
           <a:bodyPr lIns="0" rIns="0" tIns="0" bIns="0" anchor="ctr"/>
           <a:p>
-            <a:endParaRPr b="0" lang="it-IT" sz="1160" spc="-1" strike="noStrike">
-              <a:solidFill>
-                <a:srgbClr val="000000"/>
-              </a:solidFill>
-              <a:uFill>
-                <a:solidFill>
-                  <a:srgbClr val="ffffff"/>
-                </a:solidFill>
-              </a:uFill>
-              <a:latin typeface="Calibri"/>
+            <a:pPr algn="ctr"/>
+            <a:endParaRPr b="0" lang="it-IT" sz="4400" spc="-1" strike="noStrike">
+              <a:solidFill>
+                <a:srgbClr val="000000"/>
+              </a:solidFill>
+              <a:uFill>
+                <a:solidFill>
+                  <a:srgbClr val="ffffff"/>
+                </a:solidFill>
+              </a:uFill>
+              <a:latin typeface="Arial"/>
             </a:endParaRPr>
           </a:p>
         </p:txBody>
@@ -1330,7 +1343,7 @@
       </p:grpSpPr>
       <p:sp>
         <p:nvSpPr>
-          <p:cNvPr id="13" name="PlaceHolder 1"/>
+          <p:cNvPr id="10" name="PlaceHolder 1"/>
           <p:cNvSpPr>
             <a:spLocks noGrp="1"/>
           </p:cNvSpPr>
@@ -1341,7 +1354,7 @@
         <p:spPr>
           <a:xfrm>
             <a:off x="567000" y="1749960"/>
-            <a:ext cx="6425280" cy="17254440"/>
+            <a:ext cx="6424560" cy="17251200"/>
           </a:xfrm>
           <a:prstGeom prst="rect">
             <a:avLst/>
@@ -1389,7 +1402,7 @@
       </p:grpSpPr>
       <p:sp>
         <p:nvSpPr>
-          <p:cNvPr id="14" name="PlaceHolder 1"/>
+          <p:cNvPr id="11" name="PlaceHolder 1"/>
           <p:cNvSpPr>
             <a:spLocks noGrp="1"/>
           </p:cNvSpPr>
@@ -1400,7 +1413,7 @@
         <p:spPr>
           <a:xfrm>
             <a:off x="567000" y="1749960"/>
-            <a:ext cx="6425280" cy="3722040"/>
+            <a:ext cx="6424560" cy="3721320"/>
           </a:xfrm>
           <a:prstGeom prst="rect">
             <a:avLst/>
@@ -1409,23 +1422,24 @@
         <p:txBody>
           <a:bodyPr lIns="0" rIns="0" tIns="0" bIns="0" anchor="ctr"/>
           <a:p>
-            <a:endParaRPr b="0" lang="it-IT" sz="1160" spc="-1" strike="noStrike">
-              <a:solidFill>
-                <a:srgbClr val="000000"/>
-              </a:solidFill>
-              <a:uFill>
-                <a:solidFill>
-                  <a:srgbClr val="ffffff"/>
-                </a:solidFill>
-              </a:uFill>
-              <a:latin typeface="Calibri"/>
-            </a:endParaRPr>
-          </a:p>
-        </p:txBody>
-      </p:sp>
-      <p:sp>
-        <p:nvSpPr>
-          <p:cNvPr id="15" name="PlaceHolder 2"/>
+            <a:pPr algn="ctr"/>
+            <a:endParaRPr b="0" lang="it-IT" sz="4400" spc="-1" strike="noStrike">
+              <a:solidFill>
+                <a:srgbClr val="000000"/>
+              </a:solidFill>
+              <a:uFill>
+                <a:solidFill>
+                  <a:srgbClr val="ffffff"/>
+                </a:solidFill>
+              </a:uFill>
+              <a:latin typeface="Arial"/>
+            </a:endParaRPr>
+          </a:p>
+        </p:txBody>
+      </p:sp>
+      <p:sp>
+        <p:nvSpPr>
+          <p:cNvPr id="12" name="PlaceHolder 2"/>
           <p:cNvSpPr>
             <a:spLocks noGrp="1"/>
           </p:cNvSpPr>
@@ -1436,7 +1450,7 @@
         <p:spPr>
           <a:xfrm>
             <a:off x="377640" y="2501640"/>
-            <a:ext cx="3319920" cy="2957400"/>
+            <a:ext cx="3319560" cy="2957400"/>
           </a:xfrm>
           <a:prstGeom prst="rect">
             <a:avLst/>
@@ -1445,23 +1459,23 @@
         <p:txBody>
           <a:bodyPr lIns="0" rIns="0" tIns="0" bIns="0"/>
           <a:p>
-            <a:endParaRPr b="0" lang="it-IT" sz="2320" spc="-1" strike="noStrike">
-              <a:solidFill>
-                <a:srgbClr val="000000"/>
-              </a:solidFill>
-              <a:uFill>
-                <a:solidFill>
-                  <a:srgbClr val="ffffff"/>
-                </a:solidFill>
-              </a:uFill>
-              <a:latin typeface="Calibri"/>
-            </a:endParaRPr>
-          </a:p>
-        </p:txBody>
-      </p:sp>
-      <p:sp>
-        <p:nvSpPr>
-          <p:cNvPr id="16" name="PlaceHolder 3"/>
+            <a:endParaRPr b="0" lang="it-IT" sz="3200" spc="-1" strike="noStrike">
+              <a:solidFill>
+                <a:srgbClr val="000000"/>
+              </a:solidFill>
+              <a:uFill>
+                <a:solidFill>
+                  <a:srgbClr val="ffffff"/>
+                </a:solidFill>
+              </a:uFill>
+              <a:latin typeface="Arial"/>
+            </a:endParaRPr>
+          </a:p>
+        </p:txBody>
+      </p:sp>
+      <p:sp>
+        <p:nvSpPr>
+          <p:cNvPr id="13" name="PlaceHolder 3"/>
           <p:cNvSpPr>
             <a:spLocks noGrp="1"/>
           </p:cNvSpPr>
@@ -1472,7 +1486,7 @@
         <p:spPr>
           <a:xfrm>
             <a:off x="377640" y="5740560"/>
-            <a:ext cx="3319920" cy="2957400"/>
+            <a:ext cx="3319560" cy="2957400"/>
           </a:xfrm>
           <a:prstGeom prst="rect">
             <a:avLst/>
@@ -1481,23 +1495,23 @@
         <p:txBody>
           <a:bodyPr lIns="0" rIns="0" tIns="0" bIns="0"/>
           <a:p>
-            <a:endParaRPr b="0" lang="it-IT" sz="2320" spc="-1" strike="noStrike">
-              <a:solidFill>
-                <a:srgbClr val="000000"/>
-              </a:solidFill>
-              <a:uFill>
-                <a:solidFill>
-                  <a:srgbClr val="ffffff"/>
-                </a:solidFill>
-              </a:uFill>
-              <a:latin typeface="Calibri"/>
-            </a:endParaRPr>
-          </a:p>
-        </p:txBody>
-      </p:sp>
-      <p:sp>
-        <p:nvSpPr>
-          <p:cNvPr id="17" name="PlaceHolder 4"/>
+            <a:endParaRPr b="0" lang="it-IT" sz="3200" spc="-1" strike="noStrike">
+              <a:solidFill>
+                <a:srgbClr val="000000"/>
+              </a:solidFill>
+              <a:uFill>
+                <a:solidFill>
+                  <a:srgbClr val="ffffff"/>
+                </a:solidFill>
+              </a:uFill>
+              <a:latin typeface="Arial"/>
+            </a:endParaRPr>
+          </a:p>
+        </p:txBody>
+      </p:sp>
+      <p:sp>
+        <p:nvSpPr>
+          <p:cNvPr id="14" name="PlaceHolder 4"/>
           <p:cNvSpPr>
             <a:spLocks noGrp="1"/>
           </p:cNvSpPr>
@@ -1507,8 +1521,8 @@
         </p:nvSpPr>
         <p:spPr>
           <a:xfrm>
-            <a:off x="3863880" y="2501640"/>
-            <a:ext cx="3319920" cy="6200640"/>
+            <a:off x="3863520" y="2501640"/>
+            <a:ext cx="3319560" cy="6200280"/>
           </a:xfrm>
           <a:prstGeom prst="rect">
             <a:avLst/>
@@ -1517,16 +1531,16 @@
         <p:txBody>
           <a:bodyPr lIns="0" rIns="0" tIns="0" bIns="0"/>
           <a:p>
-            <a:endParaRPr b="0" lang="it-IT" sz="2320" spc="-1" strike="noStrike">
-              <a:solidFill>
-                <a:srgbClr val="000000"/>
-              </a:solidFill>
-              <a:uFill>
-                <a:solidFill>
-                  <a:srgbClr val="ffffff"/>
-                </a:solidFill>
-              </a:uFill>
-              <a:latin typeface="Calibri"/>
+            <a:endParaRPr b="0" lang="it-IT" sz="3200" spc="-1" strike="noStrike">
+              <a:solidFill>
+                <a:srgbClr val="000000"/>
+              </a:solidFill>
+              <a:uFill>
+                <a:solidFill>
+                  <a:srgbClr val="ffffff"/>
+                </a:solidFill>
+              </a:uFill>
+              <a:latin typeface="Arial"/>
             </a:endParaRPr>
           </a:p>
         </p:txBody>
@@ -1555,7 +1569,7 @@
       </p:grpSpPr>
       <p:sp>
         <p:nvSpPr>
-          <p:cNvPr id="18" name="PlaceHolder 1"/>
+          <p:cNvPr id="15" name="PlaceHolder 1"/>
           <p:cNvSpPr>
             <a:spLocks noGrp="1"/>
           </p:cNvSpPr>
@@ -1566,7 +1580,7 @@
         <p:spPr>
           <a:xfrm>
             <a:off x="567000" y="1749960"/>
-            <a:ext cx="6425280" cy="3722040"/>
+            <a:ext cx="6424560" cy="3721320"/>
           </a:xfrm>
           <a:prstGeom prst="rect">
             <a:avLst/>
@@ -1575,23 +1589,24 @@
         <p:txBody>
           <a:bodyPr lIns="0" rIns="0" tIns="0" bIns="0" anchor="ctr"/>
           <a:p>
-            <a:endParaRPr b="0" lang="it-IT" sz="1160" spc="-1" strike="noStrike">
-              <a:solidFill>
-                <a:srgbClr val="000000"/>
-              </a:solidFill>
-              <a:uFill>
-                <a:solidFill>
-                  <a:srgbClr val="ffffff"/>
-                </a:solidFill>
-              </a:uFill>
-              <a:latin typeface="Calibri"/>
-            </a:endParaRPr>
-          </a:p>
-        </p:txBody>
-      </p:sp>
-      <p:sp>
-        <p:nvSpPr>
-          <p:cNvPr id="19" name="PlaceHolder 2"/>
+            <a:pPr algn="ctr"/>
+            <a:endParaRPr b="0" lang="it-IT" sz="4400" spc="-1" strike="noStrike">
+              <a:solidFill>
+                <a:srgbClr val="000000"/>
+              </a:solidFill>
+              <a:uFill>
+                <a:solidFill>
+                  <a:srgbClr val="ffffff"/>
+                </a:solidFill>
+              </a:uFill>
+              <a:latin typeface="Arial"/>
+            </a:endParaRPr>
+          </a:p>
+        </p:txBody>
+      </p:sp>
+      <p:sp>
+        <p:nvSpPr>
+          <p:cNvPr id="16" name="PlaceHolder 2"/>
           <p:cNvSpPr>
             <a:spLocks noGrp="1"/>
           </p:cNvSpPr>
@@ -1602,7 +1617,7 @@
         <p:spPr>
           <a:xfrm>
             <a:off x="377640" y="2501640"/>
-            <a:ext cx="3319920" cy="6200640"/>
+            <a:ext cx="3319560" cy="6200280"/>
           </a:xfrm>
           <a:prstGeom prst="rect">
             <a:avLst/>
@@ -1611,23 +1626,23 @@
         <p:txBody>
           <a:bodyPr lIns="0" rIns="0" tIns="0" bIns="0"/>
           <a:p>
-            <a:endParaRPr b="0" lang="it-IT" sz="2320" spc="-1" strike="noStrike">
-              <a:solidFill>
-                <a:srgbClr val="000000"/>
-              </a:solidFill>
-              <a:uFill>
-                <a:solidFill>
-                  <a:srgbClr val="ffffff"/>
-                </a:solidFill>
-              </a:uFill>
-              <a:latin typeface="Calibri"/>
-            </a:endParaRPr>
-          </a:p>
-        </p:txBody>
-      </p:sp>
-      <p:sp>
-        <p:nvSpPr>
-          <p:cNvPr id="20" name="PlaceHolder 3"/>
+            <a:endParaRPr b="0" lang="it-IT" sz="3200" spc="-1" strike="noStrike">
+              <a:solidFill>
+                <a:srgbClr val="000000"/>
+              </a:solidFill>
+              <a:uFill>
+                <a:solidFill>
+                  <a:srgbClr val="ffffff"/>
+                </a:solidFill>
+              </a:uFill>
+              <a:latin typeface="Arial"/>
+            </a:endParaRPr>
+          </a:p>
+        </p:txBody>
+      </p:sp>
+      <p:sp>
+        <p:nvSpPr>
+          <p:cNvPr id="17" name="PlaceHolder 3"/>
           <p:cNvSpPr>
             <a:spLocks noGrp="1"/>
           </p:cNvSpPr>
@@ -1637,8 +1652,8 @@
         </p:nvSpPr>
         <p:spPr>
           <a:xfrm>
-            <a:off x="3863880" y="2501640"/>
-            <a:ext cx="3319920" cy="2957400"/>
+            <a:off x="3863520" y="2501640"/>
+            <a:ext cx="3319560" cy="2957400"/>
           </a:xfrm>
           <a:prstGeom prst="rect">
             <a:avLst/>
@@ -1647,23 +1662,23 @@
         <p:txBody>
           <a:bodyPr lIns="0" rIns="0" tIns="0" bIns="0"/>
           <a:p>
-            <a:endParaRPr b="0" lang="it-IT" sz="2320" spc="-1" strike="noStrike">
-              <a:solidFill>
-                <a:srgbClr val="000000"/>
-              </a:solidFill>
-              <a:uFill>
-                <a:solidFill>
-                  <a:srgbClr val="ffffff"/>
-                </a:solidFill>
-              </a:uFill>
-              <a:latin typeface="Calibri"/>
-            </a:endParaRPr>
-          </a:p>
-        </p:txBody>
-      </p:sp>
-      <p:sp>
-        <p:nvSpPr>
-          <p:cNvPr id="21" name="PlaceHolder 4"/>
+            <a:endParaRPr b="0" lang="it-IT" sz="3200" spc="-1" strike="noStrike">
+              <a:solidFill>
+                <a:srgbClr val="000000"/>
+              </a:solidFill>
+              <a:uFill>
+                <a:solidFill>
+                  <a:srgbClr val="ffffff"/>
+                </a:solidFill>
+              </a:uFill>
+              <a:latin typeface="Arial"/>
+            </a:endParaRPr>
+          </a:p>
+        </p:txBody>
+      </p:sp>
+      <p:sp>
+        <p:nvSpPr>
+          <p:cNvPr id="18" name="PlaceHolder 4"/>
           <p:cNvSpPr>
             <a:spLocks noGrp="1"/>
           </p:cNvSpPr>
@@ -1673,8 +1688,8 @@
         </p:nvSpPr>
         <p:spPr>
           <a:xfrm>
-            <a:off x="3863880" y="5740560"/>
-            <a:ext cx="3319920" cy="2957400"/>
+            <a:off x="3863520" y="5740560"/>
+            <a:ext cx="3319560" cy="2957400"/>
           </a:xfrm>
           <a:prstGeom prst="rect">
             <a:avLst/>
@@ -1683,16 +1698,16 @@
         <p:txBody>
           <a:bodyPr lIns="0" rIns="0" tIns="0" bIns="0"/>
           <a:p>
-            <a:endParaRPr b="0" lang="it-IT" sz="2320" spc="-1" strike="noStrike">
-              <a:solidFill>
-                <a:srgbClr val="000000"/>
-              </a:solidFill>
-              <a:uFill>
-                <a:solidFill>
-                  <a:srgbClr val="ffffff"/>
-                </a:solidFill>
-              </a:uFill>
-              <a:latin typeface="Calibri"/>
+            <a:endParaRPr b="0" lang="it-IT" sz="3200" spc="-1" strike="noStrike">
+              <a:solidFill>
+                <a:srgbClr val="000000"/>
+              </a:solidFill>
+              <a:uFill>
+                <a:solidFill>
+                  <a:srgbClr val="ffffff"/>
+                </a:solidFill>
+              </a:uFill>
+              <a:latin typeface="Arial"/>
             </a:endParaRPr>
           </a:p>
         </p:txBody>
@@ -1721,7 +1736,7 @@
       </p:grpSpPr>
       <p:sp>
         <p:nvSpPr>
-          <p:cNvPr id="22" name="PlaceHolder 1"/>
+          <p:cNvPr id="19" name="PlaceHolder 1"/>
           <p:cNvSpPr>
             <a:spLocks noGrp="1"/>
           </p:cNvSpPr>
@@ -1732,7 +1747,7 @@
         <p:spPr>
           <a:xfrm>
             <a:off x="567000" y="1749960"/>
-            <a:ext cx="6425280" cy="3722040"/>
+            <a:ext cx="6424560" cy="3721320"/>
           </a:xfrm>
           <a:prstGeom prst="rect">
             <a:avLst/>
@@ -1741,23 +1756,24 @@
         <p:txBody>
           <a:bodyPr lIns="0" rIns="0" tIns="0" bIns="0" anchor="ctr"/>
           <a:p>
-            <a:endParaRPr b="0" lang="it-IT" sz="1160" spc="-1" strike="noStrike">
-              <a:solidFill>
-                <a:srgbClr val="000000"/>
-              </a:solidFill>
-              <a:uFill>
-                <a:solidFill>
-                  <a:srgbClr val="ffffff"/>
-                </a:solidFill>
-              </a:uFill>
-              <a:latin typeface="Calibri"/>
-            </a:endParaRPr>
-          </a:p>
-        </p:txBody>
-      </p:sp>
-      <p:sp>
-        <p:nvSpPr>
-          <p:cNvPr id="23" name="PlaceHolder 2"/>
+            <a:pPr algn="ctr"/>
+            <a:endParaRPr b="0" lang="it-IT" sz="4400" spc="-1" strike="noStrike">
+              <a:solidFill>
+                <a:srgbClr val="000000"/>
+              </a:solidFill>
+              <a:uFill>
+                <a:solidFill>
+                  <a:srgbClr val="ffffff"/>
+                </a:solidFill>
+              </a:uFill>
+              <a:latin typeface="Arial"/>
+            </a:endParaRPr>
+          </a:p>
+        </p:txBody>
+      </p:sp>
+      <p:sp>
+        <p:nvSpPr>
+          <p:cNvPr id="20" name="PlaceHolder 2"/>
           <p:cNvSpPr>
             <a:spLocks noGrp="1"/>
           </p:cNvSpPr>
@@ -1768,7 +1784,7 @@
         <p:spPr>
           <a:xfrm>
             <a:off x="377640" y="2501640"/>
-            <a:ext cx="3319920" cy="2957400"/>
+            <a:ext cx="3319560" cy="2957400"/>
           </a:xfrm>
           <a:prstGeom prst="rect">
             <a:avLst/>
@@ -1777,23 +1793,23 @@
         <p:txBody>
           <a:bodyPr lIns="0" rIns="0" tIns="0" bIns="0"/>
           <a:p>
-            <a:endParaRPr b="0" lang="it-IT" sz="2320" spc="-1" strike="noStrike">
-              <a:solidFill>
-                <a:srgbClr val="000000"/>
-              </a:solidFill>
-              <a:uFill>
-                <a:solidFill>
-                  <a:srgbClr val="ffffff"/>
-                </a:solidFill>
-              </a:uFill>
-              <a:latin typeface="Calibri"/>
-            </a:endParaRPr>
-          </a:p>
-        </p:txBody>
-      </p:sp>
-      <p:sp>
-        <p:nvSpPr>
-          <p:cNvPr id="24" name="PlaceHolder 3"/>
+            <a:endParaRPr b="0" lang="it-IT" sz="3200" spc="-1" strike="noStrike">
+              <a:solidFill>
+                <a:srgbClr val="000000"/>
+              </a:solidFill>
+              <a:uFill>
+                <a:solidFill>
+                  <a:srgbClr val="ffffff"/>
+                </a:solidFill>
+              </a:uFill>
+              <a:latin typeface="Arial"/>
+            </a:endParaRPr>
+          </a:p>
+        </p:txBody>
+      </p:sp>
+      <p:sp>
+        <p:nvSpPr>
+          <p:cNvPr id="21" name="PlaceHolder 3"/>
           <p:cNvSpPr>
             <a:spLocks noGrp="1"/>
           </p:cNvSpPr>
@@ -1803,8 +1819,8 @@
         </p:nvSpPr>
         <p:spPr>
           <a:xfrm>
-            <a:off x="3863880" y="2501640"/>
-            <a:ext cx="3319920" cy="2957400"/>
+            <a:off x="3863520" y="2501640"/>
+            <a:ext cx="3319560" cy="2957400"/>
           </a:xfrm>
           <a:prstGeom prst="rect">
             <a:avLst/>
@@ -1813,23 +1829,23 @@
         <p:txBody>
           <a:bodyPr lIns="0" rIns="0" tIns="0" bIns="0"/>
           <a:p>
-            <a:endParaRPr b="0" lang="it-IT" sz="2320" spc="-1" strike="noStrike">
-              <a:solidFill>
-                <a:srgbClr val="000000"/>
-              </a:solidFill>
-              <a:uFill>
-                <a:solidFill>
-                  <a:srgbClr val="ffffff"/>
-                </a:solidFill>
-              </a:uFill>
-              <a:latin typeface="Calibri"/>
-            </a:endParaRPr>
-          </a:p>
-        </p:txBody>
-      </p:sp>
-      <p:sp>
-        <p:nvSpPr>
-          <p:cNvPr id="25" name="PlaceHolder 4"/>
+            <a:endParaRPr b="0" lang="it-IT" sz="3200" spc="-1" strike="noStrike">
+              <a:solidFill>
+                <a:srgbClr val="000000"/>
+              </a:solidFill>
+              <a:uFill>
+                <a:solidFill>
+                  <a:srgbClr val="ffffff"/>
+                </a:solidFill>
+              </a:uFill>
+              <a:latin typeface="Arial"/>
+            </a:endParaRPr>
+          </a:p>
+        </p:txBody>
+      </p:sp>
+      <p:sp>
+        <p:nvSpPr>
+          <p:cNvPr id="22" name="PlaceHolder 4"/>
           <p:cNvSpPr>
             <a:spLocks noGrp="1"/>
           </p:cNvSpPr>
@@ -1840,7 +1856,7 @@
         <p:spPr>
           <a:xfrm>
             <a:off x="377640" y="5740560"/>
-            <a:ext cx="6803280" cy="2957400"/>
+            <a:ext cx="6802920" cy="2957400"/>
           </a:xfrm>
           <a:prstGeom prst="rect">
             <a:avLst/>
@@ -1849,16 +1865,16 @@
         <p:txBody>
           <a:bodyPr lIns="0" rIns="0" tIns="0" bIns="0"/>
           <a:p>
-            <a:endParaRPr b="0" lang="it-IT" sz="2320" spc="-1" strike="noStrike">
-              <a:solidFill>
-                <a:srgbClr val="000000"/>
-              </a:solidFill>
-              <a:uFill>
-                <a:solidFill>
-                  <a:srgbClr val="ffffff"/>
-                </a:solidFill>
-              </a:uFill>
-              <a:latin typeface="Calibri"/>
+            <a:endParaRPr b="0" lang="it-IT" sz="3200" spc="-1" strike="noStrike">
+              <a:solidFill>
+                <a:srgbClr val="000000"/>
+              </a:solidFill>
+              <a:uFill>
+                <a:solidFill>
+                  <a:srgbClr val="ffffff"/>
+                </a:solidFill>
+              </a:uFill>
+              <a:latin typeface="Arial"/>
             </a:endParaRPr>
           </a:p>
         </p:txBody>
@@ -1905,22 +1921,17 @@
         <p:spPr>
           <a:xfrm>
             <a:off x="567000" y="1749960"/>
-            <a:ext cx="6425280" cy="3722040"/>
-          </a:xfrm>
-          <a:prstGeom prst="rect">
-            <a:avLst/>
-          </a:prstGeom>
-        </p:spPr>
-        <p:txBody>
-          <a:bodyPr anchor="b"/>
-          <a:p>
-            <a:pPr algn="ctr">
-              <a:lnSpc>
-                <a:spcPct val="100000"/>
-              </a:lnSpc>
-            </a:pPr>
+            <a:ext cx="6424560" cy="3721320"/>
+          </a:xfrm>
+          <a:prstGeom prst="rect">
+            <a:avLst/>
+          </a:prstGeom>
+        </p:spPr>
+        <p:txBody>
+          <a:bodyPr lIns="0" rIns="0" tIns="0" bIns="0" anchor="ctr"/>
+          <a:p>
             <a:r>
-              <a:rPr b="0" lang="it-IT" sz="4960" spc="-1" strike="noStrike">
+              <a:rPr b="0" lang="it-IT" sz="1800" spc="-1" strike="noStrike">
                 <a:solidFill>
                   <a:srgbClr val="000000"/>
                 </a:solidFill>
@@ -1929,20 +1940,20 @@
                     <a:srgbClr val="ffffff"/>
                   </a:solidFill>
                 </a:uFill>
-                <a:latin typeface="Calibri Light"/>
+                <a:latin typeface="Arial"/>
               </a:rPr>
-              <a:t>Fare clic per modificare lo stile del titolo</a:t>
+              <a:t>Click to edit the title text format</a:t>
             </a:r>
-            <a:endParaRPr b="0" lang="it-IT" sz="4960" spc="-1" strike="noStrike">
-              <a:solidFill>
-                <a:srgbClr val="000000"/>
-              </a:solidFill>
-              <a:uFill>
-                <a:solidFill>
-                  <a:srgbClr val="ffffff"/>
-                </a:solidFill>
-              </a:uFill>
-              <a:latin typeface="Calibri"/>
+            <a:endParaRPr b="0" lang="it-IT" sz="1800" spc="-1" strike="noStrike">
+              <a:solidFill>
+                <a:srgbClr val="000000"/>
+              </a:solidFill>
+              <a:uFill>
+                <a:solidFill>
+                  <a:srgbClr val="ffffff"/>
+                </a:solidFill>
+              </a:uFill>
+              <a:latin typeface="Arial"/>
             </a:endParaRPr>
           </a:p>
         </p:txBody>
@@ -1954,159 +1965,13 @@
             <a:spLocks noGrp="1"/>
           </p:cNvSpPr>
           <p:nvPr>
-            <p:ph type="dt"/>
-          </p:nvPr>
-        </p:nvSpPr>
-        <p:spPr>
-          <a:xfrm>
-            <a:off x="519840" y="9909720"/>
-            <a:ext cx="1700640" cy="568800"/>
-          </a:xfrm>
-          <a:prstGeom prst="rect">
-            <a:avLst/>
-          </a:prstGeom>
-        </p:spPr>
-        <p:txBody>
-          <a:bodyPr anchor="ctr"/>
-          <a:p>
-            <a:pPr>
-              <a:lnSpc>
-                <a:spcPct val="100000"/>
-              </a:lnSpc>
-            </a:pPr>
-            <a:fld id="{2054856C-5368-4EFA-8692-AC58D9781142}" type="datetime">
-              <a:rPr b="0" lang="it-IT" sz="989" spc="-1" strike="noStrike">
-                <a:solidFill>
-                  <a:srgbClr val="8b8b8b"/>
-                </a:solidFill>
-                <a:uFill>
-                  <a:solidFill>
-                    <a:srgbClr val="ffffff"/>
-                  </a:solidFill>
-                </a:uFill>
-                <a:latin typeface="Calibri"/>
-              </a:rPr>
-              <a:t>30/05/17</a:t>
-            </a:fld>
-            <a:endParaRPr b="0" lang="it-IT" sz="1400" spc="-1" strike="noStrike">
-              <a:solidFill>
-                <a:srgbClr val="000000"/>
-              </a:solidFill>
-              <a:uFill>
-                <a:solidFill>
-                  <a:srgbClr val="ffffff"/>
-                </a:solidFill>
-              </a:uFill>
-              <a:latin typeface="Times New Roman"/>
-            </a:endParaRPr>
-          </a:p>
-        </p:txBody>
-      </p:sp>
-      <p:sp>
-        <p:nvSpPr>
-          <p:cNvPr id="2" name="PlaceHolder 3"/>
-          <p:cNvSpPr>
-            <a:spLocks noGrp="1"/>
-          </p:cNvSpPr>
-          <p:nvPr>
-            <p:ph type="ftr"/>
-          </p:nvPr>
-        </p:nvSpPr>
-        <p:spPr>
-          <a:xfrm>
-            <a:off x="2504160" y="9909720"/>
-            <a:ext cx="2550960" cy="568800"/>
-          </a:xfrm>
-          <a:prstGeom prst="rect">
-            <a:avLst/>
-          </a:prstGeom>
-        </p:spPr>
-        <p:txBody>
-          <a:bodyPr anchor="ctr"/>
-          <a:p>
-            <a:endParaRPr b="0" lang="it-IT" sz="2400" spc="-1" strike="noStrike">
-              <a:solidFill>
-                <a:srgbClr val="000000"/>
-              </a:solidFill>
-              <a:uFill>
-                <a:solidFill>
-                  <a:srgbClr val="ffffff"/>
-                </a:solidFill>
-              </a:uFill>
-              <a:latin typeface="Times New Roman"/>
-            </a:endParaRPr>
-          </a:p>
-        </p:txBody>
-      </p:sp>
-      <p:sp>
-        <p:nvSpPr>
-          <p:cNvPr id="3" name="PlaceHolder 4"/>
-          <p:cNvSpPr>
-            <a:spLocks noGrp="1"/>
-          </p:cNvSpPr>
-          <p:nvPr>
-            <p:ph type="sldNum"/>
-          </p:nvPr>
-        </p:nvSpPr>
-        <p:spPr>
-          <a:xfrm>
-            <a:off x="5339160" y="9909720"/>
-            <a:ext cx="1700640" cy="568800"/>
-          </a:xfrm>
-          <a:prstGeom prst="rect">
-            <a:avLst/>
-          </a:prstGeom>
-        </p:spPr>
-        <p:txBody>
-          <a:bodyPr anchor="ctr"/>
-          <a:p>
-            <a:pPr algn="r">
-              <a:lnSpc>
-                <a:spcPct val="100000"/>
-              </a:lnSpc>
-            </a:pPr>
-            <a:fld id="{0D8B0FD3-1455-4A0D-8C4F-C896E0BD9AA3}" type="slidenum">
-              <a:rPr b="0" lang="it-IT" sz="989" spc="-1" strike="noStrike">
-                <a:solidFill>
-                  <a:srgbClr val="8b8b8b"/>
-                </a:solidFill>
-                <a:uFill>
-                  <a:solidFill>
-                    <a:srgbClr val="ffffff"/>
-                  </a:solidFill>
-                </a:uFill>
-                <a:latin typeface="Calibri"/>
-              </a:rPr>
-              <a:t>&lt;number&gt;</a:t>
-            </a:fld>
-            <a:endParaRPr b="0" lang="it-IT" sz="1400" spc="-1" strike="noStrike">
-              <a:solidFill>
-                <a:srgbClr val="000000"/>
-              </a:solidFill>
-              <a:uFill>
-                <a:solidFill>
-                  <a:srgbClr val="ffffff"/>
-                </a:solidFill>
-              </a:uFill>
-              <a:latin typeface="Times New Roman"/>
-            </a:endParaRPr>
-          </a:p>
-        </p:txBody>
-      </p:sp>
-      <p:sp>
-        <p:nvSpPr>
-          <p:cNvPr id="4" name="PlaceHolder 5"/>
-          <p:cNvSpPr>
-            <a:spLocks noGrp="1"/>
-          </p:cNvSpPr>
-          <p:nvPr>
             <p:ph type="body"/>
           </p:nvPr>
         </p:nvSpPr>
         <p:spPr>
           <a:xfrm>
             <a:off x="377640" y="2501640"/>
-            <a:ext cx="6803280" cy="6200640"/>
+            <a:ext cx="6802920" cy="6200280"/>
           </a:xfrm>
           <a:prstGeom prst="rect">
             <a:avLst/>
@@ -2127,7 +1992,7 @@
               <a:buChar char=""/>
             </a:pPr>
             <a:r>
-              <a:rPr b="0" lang="it-IT" sz="2320" spc="-1" strike="noStrike">
+              <a:rPr b="0" lang="it-IT" sz="1800" spc="-1" strike="noStrike">
                 <a:solidFill>
                   <a:srgbClr val="000000"/>
                 </a:solidFill>
@@ -2136,20 +2001,20 @@
                     <a:srgbClr val="ffffff"/>
                   </a:solidFill>
                 </a:uFill>
-                <a:latin typeface="Calibri"/>
+                <a:latin typeface="Arial"/>
               </a:rPr>
               <a:t>Click to edit the outline text format</a:t>
             </a:r>
-            <a:endParaRPr b="0" lang="it-IT" sz="2320" spc="-1" strike="noStrike">
-              <a:solidFill>
-                <a:srgbClr val="000000"/>
-              </a:solidFill>
-              <a:uFill>
-                <a:solidFill>
-                  <a:srgbClr val="ffffff"/>
-                </a:solidFill>
-              </a:uFill>
-              <a:latin typeface="Calibri"/>
+            <a:endParaRPr b="0" lang="it-IT" sz="1800" spc="-1" strike="noStrike">
+              <a:solidFill>
+                <a:srgbClr val="000000"/>
+              </a:solidFill>
+              <a:uFill>
+                <a:solidFill>
+                  <a:srgbClr val="ffffff"/>
+                </a:solidFill>
+              </a:uFill>
+              <a:latin typeface="Arial"/>
             </a:endParaRPr>
           </a:p>
           <a:p>
@@ -2165,7 +2030,7 @@
               <a:buChar char=""/>
             </a:pPr>
             <a:r>
-              <a:rPr b="0" lang="it-IT" sz="1660" spc="-1" strike="noStrike">
+              <a:rPr b="0" lang="it-IT" sz="1800" spc="-1" strike="noStrike">
                 <a:solidFill>
                   <a:srgbClr val="000000"/>
                 </a:solidFill>
@@ -2174,20 +2039,20 @@
                     <a:srgbClr val="ffffff"/>
                   </a:solidFill>
                 </a:uFill>
-                <a:latin typeface="Calibri"/>
+                <a:latin typeface="Arial"/>
               </a:rPr>
               <a:t>Second Outline Level</a:t>
             </a:r>
-            <a:endParaRPr b="0" lang="it-IT" sz="1660" spc="-1" strike="noStrike">
-              <a:solidFill>
-                <a:srgbClr val="000000"/>
-              </a:solidFill>
-              <a:uFill>
-                <a:solidFill>
-                  <a:srgbClr val="ffffff"/>
-                </a:solidFill>
-              </a:uFill>
-              <a:latin typeface="Calibri"/>
+            <a:endParaRPr b="0" lang="it-IT" sz="1800" spc="-1" strike="noStrike">
+              <a:solidFill>
+                <a:srgbClr val="000000"/>
+              </a:solidFill>
+              <a:uFill>
+                <a:solidFill>
+                  <a:srgbClr val="ffffff"/>
+                </a:solidFill>
+              </a:uFill>
+              <a:latin typeface="Arial"/>
             </a:endParaRPr>
           </a:p>
           <a:p>
@@ -2203,7 +2068,7 @@
               <a:buChar char=""/>
             </a:pPr>
             <a:r>
-              <a:rPr b="0" lang="it-IT" sz="1490" spc="-1" strike="noStrike">
+              <a:rPr b="0" lang="it-IT" sz="1800" spc="-1" strike="noStrike">
                 <a:solidFill>
                   <a:srgbClr val="000000"/>
                 </a:solidFill>
@@ -2212,20 +2077,20 @@
                     <a:srgbClr val="ffffff"/>
                   </a:solidFill>
                 </a:uFill>
-                <a:latin typeface="Calibri"/>
+                <a:latin typeface="Arial"/>
               </a:rPr>
               <a:t>Third Outline Level</a:t>
             </a:r>
-            <a:endParaRPr b="0" lang="it-IT" sz="1490" spc="-1" strike="noStrike">
-              <a:solidFill>
-                <a:srgbClr val="000000"/>
-              </a:solidFill>
-              <a:uFill>
-                <a:solidFill>
-                  <a:srgbClr val="ffffff"/>
-                </a:solidFill>
-              </a:uFill>
-              <a:latin typeface="Calibri"/>
+            <a:endParaRPr b="0" lang="it-IT" sz="1800" spc="-1" strike="noStrike">
+              <a:solidFill>
+                <a:srgbClr val="000000"/>
+              </a:solidFill>
+              <a:uFill>
+                <a:solidFill>
+                  <a:srgbClr val="ffffff"/>
+                </a:solidFill>
+              </a:uFill>
+              <a:latin typeface="Arial"/>
             </a:endParaRPr>
           </a:p>
           <a:p>
@@ -2241,7 +2106,7 @@
               <a:buChar char=""/>
             </a:pPr>
             <a:r>
-              <a:rPr b="0" lang="it-IT" sz="1490" spc="-1" strike="noStrike">
+              <a:rPr b="0" lang="it-IT" sz="1800" spc="-1" strike="noStrike">
                 <a:solidFill>
                   <a:srgbClr val="000000"/>
                 </a:solidFill>
@@ -2250,20 +2115,20 @@
                     <a:srgbClr val="ffffff"/>
                   </a:solidFill>
                 </a:uFill>
-                <a:latin typeface="Calibri"/>
+                <a:latin typeface="Arial"/>
               </a:rPr>
               <a:t>Fourth Outline Level</a:t>
             </a:r>
-            <a:endParaRPr b="0" lang="it-IT" sz="1490" spc="-1" strike="noStrike">
-              <a:solidFill>
-                <a:srgbClr val="000000"/>
-              </a:solidFill>
-              <a:uFill>
-                <a:solidFill>
-                  <a:srgbClr val="ffffff"/>
-                </a:solidFill>
-              </a:uFill>
-              <a:latin typeface="Calibri"/>
+            <a:endParaRPr b="0" lang="it-IT" sz="1800" spc="-1" strike="noStrike">
+              <a:solidFill>
+                <a:srgbClr val="000000"/>
+              </a:solidFill>
+              <a:uFill>
+                <a:solidFill>
+                  <a:srgbClr val="ffffff"/>
+                </a:solidFill>
+              </a:uFill>
+              <a:latin typeface="Arial"/>
             </a:endParaRPr>
           </a:p>
           <a:p>
@@ -2279,7 +2144,7 @@
               <a:buChar char=""/>
             </a:pPr>
             <a:r>
-              <a:rPr b="0" lang="it-IT" sz="2000" spc="-1" strike="noStrike">
+              <a:rPr b="0" lang="it-IT" sz="1800" spc="-1" strike="noStrike">
                 <a:solidFill>
                   <a:srgbClr val="000000"/>
                 </a:solidFill>
@@ -2288,20 +2153,20 @@
                     <a:srgbClr val="ffffff"/>
                   </a:solidFill>
                 </a:uFill>
-                <a:latin typeface="Calibri"/>
+                <a:latin typeface="Arial"/>
               </a:rPr>
               <a:t>Fifth Outline Level</a:t>
             </a:r>
-            <a:endParaRPr b="0" lang="it-IT" sz="2000" spc="-1" strike="noStrike">
-              <a:solidFill>
-                <a:srgbClr val="000000"/>
-              </a:solidFill>
-              <a:uFill>
-                <a:solidFill>
-                  <a:srgbClr val="ffffff"/>
-                </a:solidFill>
-              </a:uFill>
-              <a:latin typeface="Calibri"/>
+            <a:endParaRPr b="0" lang="it-IT" sz="1800" spc="-1" strike="noStrike">
+              <a:solidFill>
+                <a:srgbClr val="000000"/>
+              </a:solidFill>
+              <a:uFill>
+                <a:solidFill>
+                  <a:srgbClr val="ffffff"/>
+                </a:solidFill>
+              </a:uFill>
+              <a:latin typeface="Arial"/>
             </a:endParaRPr>
           </a:p>
           <a:p>
@@ -2317,7 +2182,7 @@
               <a:buChar char=""/>
             </a:pPr>
             <a:r>
-              <a:rPr b="0" lang="it-IT" sz="2000" spc="-1" strike="noStrike">
+              <a:rPr b="0" lang="it-IT" sz="1800" spc="-1" strike="noStrike">
                 <a:solidFill>
                   <a:srgbClr val="000000"/>
                 </a:solidFill>
@@ -2326,20 +2191,20 @@
                     <a:srgbClr val="ffffff"/>
                   </a:solidFill>
                 </a:uFill>
-                <a:latin typeface="Calibri"/>
+                <a:latin typeface="Arial"/>
               </a:rPr>
               <a:t>Sixth Outline Level</a:t>
             </a:r>
-            <a:endParaRPr b="0" lang="it-IT" sz="2000" spc="-1" strike="noStrike">
-              <a:solidFill>
-                <a:srgbClr val="000000"/>
-              </a:solidFill>
-              <a:uFill>
-                <a:solidFill>
-                  <a:srgbClr val="ffffff"/>
-                </a:solidFill>
-              </a:uFill>
-              <a:latin typeface="Calibri"/>
+            <a:endParaRPr b="0" lang="it-IT" sz="1800" spc="-1" strike="noStrike">
+              <a:solidFill>
+                <a:srgbClr val="000000"/>
+              </a:solidFill>
+              <a:uFill>
+                <a:solidFill>
+                  <a:srgbClr val="ffffff"/>
+                </a:solidFill>
+              </a:uFill>
+              <a:latin typeface="Arial"/>
             </a:endParaRPr>
           </a:p>
           <a:p>
@@ -2355,7 +2220,7 @@
               <a:buChar char=""/>
             </a:pPr>
             <a:r>
-              <a:rPr b="0" lang="it-IT" sz="2000" spc="-1" strike="noStrike">
+              <a:rPr b="0" lang="it-IT" sz="1800" spc="-1" strike="noStrike">
                 <a:solidFill>
                   <a:srgbClr val="000000"/>
                 </a:solidFill>
@@ -2364,20 +2229,20 @@
                     <a:srgbClr val="ffffff"/>
                   </a:solidFill>
                 </a:uFill>
-                <a:latin typeface="Calibri"/>
+                <a:latin typeface="Arial"/>
               </a:rPr>
               <a:t>Seventh Outline Level</a:t>
             </a:r>
-            <a:endParaRPr b="0" lang="it-IT" sz="2000" spc="-1" strike="noStrike">
-              <a:solidFill>
-                <a:srgbClr val="000000"/>
-              </a:solidFill>
-              <a:uFill>
-                <a:solidFill>
-                  <a:srgbClr val="ffffff"/>
-                </a:solidFill>
-              </a:uFill>
-              <a:latin typeface="Calibri"/>
+            <a:endParaRPr b="0" lang="it-IT" sz="1800" spc="-1" strike="noStrike">
+              <a:solidFill>
+                <a:srgbClr val="000000"/>
+              </a:solidFill>
+              <a:uFill>
+                <a:solidFill>
+                  <a:srgbClr val="ffffff"/>
+                </a:solidFill>
+              </a:uFill>
+              <a:latin typeface="Arial"/>
             </a:endParaRPr>
           </a:p>
         </p:txBody>
@@ -2421,7 +2286,7 @@
       </p:grpSpPr>
       <p:pic>
         <p:nvPicPr>
-          <p:cNvPr id="44" name="Immagine 5" descr=""/>
+          <p:cNvPr id="41" name="Immagine 5" descr=""/>
           <p:cNvPicPr/>
           <p:nvPr/>
         </p:nvPicPr>
@@ -2432,7 +2297,7 @@
         <p:spPr>
           <a:xfrm>
             <a:off x="-156600" y="0"/>
-            <a:ext cx="8337240" cy="10691280"/>
+            <a:ext cx="8336520" cy="10690560"/>
           </a:xfrm>
           <a:prstGeom prst="rect">
             <a:avLst/>
@@ -2444,14 +2309,14 @@
       </p:pic>
       <p:sp>
         <p:nvSpPr>
-          <p:cNvPr id="45" name="CustomShape 1"/>
+          <p:cNvPr id="42" name="CustomShape 1"/>
           <p:cNvSpPr/>
           <p:nvPr/>
         </p:nvSpPr>
         <p:spPr>
           <a:xfrm>
-            <a:off x="1894680" y="3161880"/>
-            <a:ext cx="6390000" cy="1737720"/>
+            <a:off x="1962360" y="3374640"/>
+            <a:ext cx="6389280" cy="1737000"/>
           </a:xfrm>
           <a:prstGeom prst="rect">
             <a:avLst/>
@@ -2468,7 +2333,7 @@
           <a:fontRef idx="minor"/>
         </p:style>
         <p:txBody>
-          <a:bodyPr/>
+          <a:bodyPr lIns="90000" rIns="90000" tIns="45000" bIns="45000"/>
           <a:p>
             <a:pPr algn="ctr">
               <a:lnSpc>
@@ -2486,6 +2351,7 @@
                   </a:solidFill>
                 </a:uFill>
                 <a:latin typeface="Calibri"/>
+                <a:ea typeface="DejaVu Sans"/>
               </a:rPr>
               <a:t>Regolazione di un cogeneratore </a:t>
             </a:r>
@@ -2505,14 +2371,14 @@
       </p:sp>
       <p:sp>
         <p:nvSpPr>
-          <p:cNvPr id="46" name="CustomShape 2"/>
+          <p:cNvPr id="43" name="CustomShape 2"/>
           <p:cNvSpPr/>
           <p:nvPr/>
         </p:nvSpPr>
         <p:spPr>
           <a:xfrm>
             <a:off x="2475360" y="5585040"/>
-            <a:ext cx="5221800" cy="518400"/>
+            <a:ext cx="5221080" cy="517680"/>
           </a:xfrm>
           <a:prstGeom prst="rect">
             <a:avLst/>
@@ -2529,7 +2395,7 @@
           <a:fontRef idx="minor"/>
         </p:style>
         <p:txBody>
-          <a:bodyPr/>
+          <a:bodyPr lIns="90000" rIns="90000" tIns="45000" bIns="45000"/>
           <a:p>
             <a:pPr algn="ctr">
               <a:lnSpc>
@@ -2547,6 +2413,7 @@
                   </a:solidFill>
                 </a:uFill>
                 <a:latin typeface="Calibri"/>
+                <a:ea typeface="DejaVu Sans"/>
               </a:rPr>
               <a:t>Sfruttando la piattaforma Arduino</a:t>
             </a:r>
@@ -2566,14 +2433,14 @@
       </p:sp>
       <p:sp>
         <p:nvSpPr>
-          <p:cNvPr id="47" name="CustomShape 3"/>
+          <p:cNvPr id="44" name="CustomShape 3"/>
           <p:cNvSpPr/>
           <p:nvPr/>
         </p:nvSpPr>
         <p:spPr>
           <a:xfrm>
             <a:off x="2289600" y="2677680"/>
-            <a:ext cx="5495400" cy="640440"/>
+            <a:ext cx="5494680" cy="639720"/>
           </a:xfrm>
           <a:prstGeom prst="rect">
             <a:avLst/>
@@ -2590,7 +2457,7 @@
           <a:fontRef idx="minor"/>
         </p:style>
         <p:txBody>
-          <a:bodyPr/>
+          <a:bodyPr lIns="90000" rIns="90000" tIns="45000" bIns="45000"/>
           <a:p>
             <a:pPr algn="ctr">
               <a:lnSpc>
@@ -2608,6 +2475,7 @@
                   </a:solidFill>
                 </a:uFill>
                 <a:latin typeface="Calibri"/>
+                <a:ea typeface="DejaVu Sans"/>
               </a:rPr>
               <a:t>Specializzazione ENERGIA – Classe 5AEN </a:t>
             </a:r>
@@ -2640,6 +2508,7 @@
                   </a:solidFill>
                 </a:uFill>
                 <a:latin typeface="Calibri"/>
+                <a:ea typeface="DejaVu Sans"/>
               </a:rPr>
               <a:t> </a:t>
             </a:r>
@@ -2654,8 +2523,9 @@
                   </a:solidFill>
                 </a:uFill>
                 <a:latin typeface="Calibri"/>
+                <a:ea typeface="DejaVu Sans"/>
               </a:rPr>
-              <a:t>Studenti: Fusco Alberto e Campello Manuel</a:t>
+              <a:t>Studenti: Campello Manuel e Fusco Alberto</a:t>
             </a:r>
             <a:endParaRPr b="0" lang="it-IT" sz="1800" spc="-1" strike="noStrike">
               <a:solidFill>
@@ -2673,14 +2543,14 @@
       </p:sp>
       <p:sp>
         <p:nvSpPr>
-          <p:cNvPr id="48" name="CustomShape 4"/>
+          <p:cNvPr id="45" name="CustomShape 4"/>
           <p:cNvSpPr/>
           <p:nvPr/>
         </p:nvSpPr>
         <p:spPr>
           <a:xfrm>
-            <a:off x="0" y="9199080"/>
-            <a:ext cx="6416280" cy="1189080"/>
+            <a:off x="-7560" y="9072000"/>
+            <a:ext cx="5911560" cy="1188360"/>
           </a:xfrm>
           <a:prstGeom prst="rect">
             <a:avLst/>
@@ -2697,7 +2567,7 @@
           <a:fontRef idx="minor"/>
         </p:style>
         <p:txBody>
-          <a:bodyPr/>
+          <a:bodyPr lIns="90000" rIns="90000" tIns="45000" bIns="45000"/>
           <a:p>
             <a:pPr algn="ctr">
               <a:lnSpc>
@@ -2705,7 +2575,7 @@
               </a:lnSpc>
             </a:pPr>
             <a:r>
-              <a:rPr b="1" lang="it-IT" sz="2400" spc="49" strike="noStrike">
+              <a:rPr b="1" lang="it-IT" sz="2400" spc="43" strike="noStrike">
                 <a:solidFill>
                   <a:srgbClr val="fefefd"/>
                 </a:solidFill>
@@ -2715,6 +2585,7 @@
                   </a:solidFill>
                 </a:uFill>
                 <a:latin typeface="Calibri"/>
+                <a:ea typeface="DejaVu Sans"/>
               </a:rPr>
               <a:t>La cogenerazione è un processo per ottimizzare la combustione, generando elettricità e calore</a:t>
             </a:r>
@@ -2734,14 +2605,14 @@
       </p:sp>
       <p:sp>
         <p:nvSpPr>
-          <p:cNvPr id="49" name="CustomShape 5"/>
+          <p:cNvPr id="46" name="CustomShape 5"/>
           <p:cNvSpPr/>
           <p:nvPr/>
         </p:nvSpPr>
         <p:spPr>
           <a:xfrm>
             <a:off x="-156600" y="10107000"/>
-            <a:ext cx="1894320" cy="577080"/>
+            <a:ext cx="1893600" cy="576360"/>
           </a:xfrm>
           <a:prstGeom prst="rect">
             <a:avLst/>
@@ -2776,6 +2647,7 @@
                   </a:solidFill>
                 </a:uFill>
                 <a:latin typeface="Calibri"/>
+                <a:ea typeface="DejaVu Sans"/>
               </a:rPr>
               <a:t>Docente referente:</a:t>
             </a:r>
@@ -2808,6 +2680,7 @@
                   </a:solidFill>
                 </a:uFill>
                 <a:latin typeface="Calibri"/>
+                <a:ea typeface="DejaVu Sans"/>
               </a:rPr>
               <a:t>Baldassa Paolo</a:t>
             </a:r>
@@ -2827,7 +2700,7 @@
       </p:sp>
       <p:pic>
         <p:nvPicPr>
-          <p:cNvPr id="50" name="Immagine 1" descr=""/>
+          <p:cNvPr id="47" name="Immagine 1" descr=""/>
           <p:cNvPicPr/>
           <p:nvPr/>
         </p:nvPicPr>
@@ -2838,7 +2711,7 @@
         <p:spPr>
           <a:xfrm>
             <a:off x="6429960" y="8155800"/>
-            <a:ext cx="1266840" cy="806040"/>
+            <a:ext cx="1266120" cy="805320"/>
           </a:xfrm>
           <a:prstGeom prst="rect">
             <a:avLst/>
@@ -2850,7 +2723,7 @@
       </p:pic>
       <p:pic>
         <p:nvPicPr>
-          <p:cNvPr id="51" name="Immagine 2" descr=""/>
+          <p:cNvPr id="48" name="Immagine 2" descr=""/>
           <p:cNvPicPr/>
           <p:nvPr/>
         </p:nvPicPr>
@@ -2862,7 +2735,7 @@
         <p:spPr>
           <a:xfrm>
             <a:off x="4285080" y="6157800"/>
-            <a:ext cx="1840680" cy="2682360"/>
+            <a:ext cx="1839960" cy="2681640"/>
           </a:xfrm>
           <a:prstGeom prst="rect">
             <a:avLst/>
@@ -2874,7 +2747,7 @@
       </p:pic>
       <p:pic>
         <p:nvPicPr>
-          <p:cNvPr id="52" name="Immagine 11" descr=""/>
+          <p:cNvPr id="49" name="Immagine 11" descr=""/>
           <p:cNvPicPr/>
           <p:nvPr/>
         </p:nvPicPr>
@@ -2886,7 +2759,7 @@
         <p:spPr>
           <a:xfrm>
             <a:off x="6192720" y="6176520"/>
-            <a:ext cx="1943280" cy="1887480"/>
+            <a:ext cx="1942560" cy="1886760"/>
           </a:xfrm>
           <a:prstGeom prst="rect">
             <a:avLst/>
@@ -2898,7 +2771,7 @@
       </p:pic>
       <p:pic>
         <p:nvPicPr>
-          <p:cNvPr id="53" name="Immagine 10" descr=""/>
+          <p:cNvPr id="50" name="Immagine 10" descr=""/>
           <p:cNvPicPr/>
           <p:nvPr/>
         </p:nvPicPr>
@@ -2910,7 +2783,7 @@
         <p:spPr>
           <a:xfrm>
             <a:off x="2005200" y="6173640"/>
-            <a:ext cx="2242800" cy="2788200"/>
+            <a:ext cx="2242080" cy="2787480"/>
           </a:xfrm>
           <a:prstGeom prst="rect">
             <a:avLst/>

</xml_diff>